<commit_message>
Create simple gpaxisif compatible adder
</commit_message>
<xml_diff>
--- a/Docs/Poster.pptx
+++ b/Docs/Poster.pptx
@@ -2729,7 +2729,7 @@
           <a:graphicData uri="http://schemas.openxmlformats.org/presentationml/2006/ole">
             <mc:AlternateContent xmlns:mc="http://schemas.openxmlformats.org/markup-compatibility/2006">
               <mc:Choice xmlns:v="urn:schemas-microsoft-com:vml" Requires="v">
-                <p:oleObj spid="_x0000_s1090" name="CorelDRAW" r:id="rId15" imgW="8833104" imgH="310896" progId="CorelDraw.Graphic.15">
+                <p:oleObj spid="_x0000_s1093" name="CorelDRAW" r:id="rId15" imgW="8833104" imgH="310896" progId="CorelDraw.Graphic.15">
                   <p:embed/>
                 </p:oleObj>
               </mc:Choice>
@@ -4459,7 +4459,7 @@
         <p:spPr bwMode="auto">
           <a:xfrm>
             <a:off x="803272" y="795369"/>
-            <a:ext cx="19753745" cy="4001388"/>
+            <a:ext cx="19753745" cy="4109110"/>
           </a:xfrm>
           <a:prstGeom prst="rect">
             <a:avLst/>
@@ -4607,34 +4607,71 @@
               </a:spcBef>
             </a:pPr>
             <a:r>
-              <a:rPr lang="fa-IR" altLang="en-US" sz="8000" b="1" dirty="0">
+              <a:rPr lang="fa-IR" altLang="en-US" sz="6000" b="1" dirty="0" err="1">
                 <a:cs typeface="B Titr" panose="00000700000000000000" pitchFamily="2" charset="-78"/>
               </a:rPr>
-              <a:t>عنوان</a:t>
-            </a:r>
-            <a:r>
-              <a:rPr lang="en-US" altLang="en-US" sz="8000" b="1" dirty="0">
+              <a:t>پیاده‌سازی</a:t>
+            </a:r>
+            <a:r>
+              <a:rPr lang="fa-IR" altLang="en-US" sz="6000" b="1" dirty="0">
                 <a:cs typeface="B Titr" panose="00000700000000000000" pitchFamily="2" charset="-78"/>
               </a:rPr>
               <a:t> </a:t>
             </a:r>
             <a:r>
-              <a:rPr lang="fa-IR" altLang="en-US" sz="8000" b="1" dirty="0">
+              <a:rPr lang="fa-IR" altLang="en-US" sz="6000" b="1" dirty="0" err="1">
                 <a:cs typeface="B Titr" panose="00000700000000000000" pitchFamily="2" charset="-78"/>
               </a:rPr>
-              <a:t>پروژه</a:t>
-            </a:r>
-            <a:endParaRPr lang="en-US" altLang="en-US" sz="7200" b="1" dirty="0"/>
-          </a:p>
-          <a:p>
-            <a:pPr rtl="1" eaLnBrk="1" hangingPunct="1">
-              <a:spcBef>
-                <a:spcPts val="0"/>
-              </a:spcBef>
-              <a:spcAft>
-                <a:spcPts val="600"/>
-              </a:spcAft>
-            </a:pPr>
+              <a:t>سخت‌افزاری</a:t>
+            </a:r>
+            <a:r>
+              <a:rPr lang="fa-IR" altLang="en-US" sz="6000" b="1" dirty="0">
+                <a:cs typeface="B Titr" panose="00000700000000000000" pitchFamily="2" charset="-78"/>
+              </a:rPr>
+              <a:t> </a:t>
+            </a:r>
+            <a:r>
+              <a:rPr lang="fa-IR" altLang="en-US" sz="6000" b="1" dirty="0" err="1">
+                <a:cs typeface="B Titr" panose="00000700000000000000" pitchFamily="2" charset="-78"/>
+              </a:rPr>
+              <a:t>الگوریتم</a:t>
+            </a:r>
+            <a:r>
+              <a:rPr lang="fa-IR" altLang="en-US" sz="6000" b="1" dirty="0">
+                <a:cs typeface="B Titr" panose="00000700000000000000" pitchFamily="2" charset="-78"/>
+              </a:rPr>
+              <a:t> شبکه عصبی برای تشخیص تصویر </a:t>
+            </a:r>
+            <a:r>
+              <a:rPr lang="fa-IR" altLang="en-US" sz="6000" b="1" dirty="0" err="1">
+                <a:cs typeface="B Titr" panose="00000700000000000000" pitchFamily="2" charset="-78"/>
+              </a:rPr>
+              <a:t>مجموعه‌داده</a:t>
+            </a:r>
+            <a:r>
+              <a:rPr lang="fa-IR" altLang="en-US" sz="6000" b="1" dirty="0">
+                <a:cs typeface="B Titr" panose="00000700000000000000" pitchFamily="2" charset="-78"/>
+              </a:rPr>
+              <a:t> </a:t>
+            </a:r>
+            <a:r>
+              <a:rPr lang="en-US" altLang="en-US" sz="5400" b="1" dirty="0">
+                <a:cs typeface="B Titr" panose="00000700000000000000" pitchFamily="2" charset="-78"/>
+              </a:rPr>
+              <a:t>MNIST</a:t>
+            </a:r>
+            <a:r>
+              <a:rPr lang="fa-IR" altLang="en-US" sz="6000" b="1" dirty="0">
+                <a:cs typeface="B Titr" panose="00000700000000000000" pitchFamily="2" charset="-78"/>
+              </a:rPr>
+              <a:t> بر روی </a:t>
+            </a:r>
+            <a:r>
+              <a:rPr lang="en-US" altLang="en-US" sz="5400" b="1" dirty="0">
+                <a:cs typeface="B Titr" panose="00000700000000000000" pitchFamily="2" charset="-78"/>
+              </a:rPr>
+              <a:t>FPGA</a:t>
+            </a:r>
             <a:endParaRPr lang="fa-IR" altLang="en-US" sz="2000" b="1" dirty="0">
               <a:cs typeface="B Titr" panose="00000700000000000000" pitchFamily="2" charset="-78"/>
             </a:endParaRPr>

</xml_diff>